<commit_message>
Carte des pays retouch
</commit_message>
<xml_diff>
--- a/Vincent/Carte des pays.pptx
+++ b/Vincent/Carte des pays.pptx
@@ -104,6 +104,11 @@
       </a:defRPr>
     </a:lvl9pPr>
   </p:defaultTextStyle>
+  <p:extLst>
+    <p:ext uri="{EFAFB233-063F-42B5-8137-9DF3F51BA10A}">
+      <p15:sldGuideLst xmlns:p15="http://schemas.microsoft.com/office/powerpoint/2012/main"/>
+    </p:ext>
+  </p:extLst>
 </p:presentation>
 </file>
 
@@ -4448,6 +4453,41 @@
           </a:p>
         </p:txBody>
       </p:sp>
+      <p:sp>
+        <p:nvSpPr>
+          <p:cNvPr id="2" name="ZoneTexte 1">
+            <a:extLst>
+              <a:ext uri="{FF2B5EF4-FFF2-40B4-BE49-F238E27FC236}">
+                <a16:creationId xmlns:a16="http://schemas.microsoft.com/office/drawing/2014/main" id="{E0375C22-A191-42DA-A8D1-66709FC355BF}"/>
+              </a:ext>
+            </a:extLst>
+          </p:cNvPr>
+          <p:cNvSpPr txBox="1"/>
+          <p:nvPr/>
+        </p:nvSpPr>
+        <p:spPr>
+          <a:xfrm>
+            <a:off x="6584945" y="5533337"/>
+            <a:ext cx="1349996" cy="369332"/>
+          </a:xfrm>
+          <a:prstGeom prst="rect">
+            <a:avLst/>
+          </a:prstGeom>
+          <a:noFill/>
+        </p:spPr>
+        <p:txBody>
+          <a:bodyPr wrap="square" rtlCol="0">
+            <a:spAutoFit/>
+          </a:bodyPr>
+          <a:lstStyle/>
+          <a:p>
+            <a:r>
+              <a:rPr lang="fr-FR" dirty="0"/>
+              <a:t>Madagascar</a:t>
+            </a:r>
+          </a:p>
+        </p:txBody>
+      </p:sp>
     </p:spTree>
     <p:extLst>
       <p:ext uri="{BB962C8B-B14F-4D97-AF65-F5344CB8AC3E}">

</xml_diff>